<commit_message>
Update Accessibility for Live Presentations.pptx
</commit_message>
<xml_diff>
--- a/Accessibility for Live Presentations.pptx
+++ b/Accessibility for Live Presentations.pptx
@@ -5606,7 +5606,9 @@
         </p:nvSpPr>
         <p:spPr/>
         <p:txBody>
-          <a:bodyPr/>
+          <a:bodyPr>
+            <a:normAutofit lnSpcReduction="10000"/>
+          </a:bodyPr>
           <a:lstStyle/>
           <a:p>
             <a:r>
@@ -5621,6 +5623,38 @@
                 <a:hlinkClick r:id="rId2"/>
               </a:rPr>
               <a:t>https://support.office.com/en-us/article/make-your-powerpoint-presentations-accessible-to-people-with-disabilities-6f7772b2-2f33-4bd2-8ca7-dae3b2b3ef25</a:t>
+            </a:r>
+            <a:endParaRPr lang="en-US" dirty="0"/>
+          </a:p>
+          <a:p>
+            <a:r>
+              <a:rPr lang="en-US" dirty="0"/>
+              <a:t>Use dictation to talk instead of type on your PC</a:t>
+            </a:r>
+          </a:p>
+          <a:p>
+            <a:pPr lvl="1"/>
+            <a:r>
+              <a:rPr lang="en-US" dirty="0">
+                <a:hlinkClick r:id="rId3"/>
+              </a:rPr>
+              <a:t>https://support.microsoft.com/en-us/help/4042244/windows-10-use-dictation</a:t>
+            </a:r>
+            <a:endParaRPr lang="en-US" dirty="0"/>
+          </a:p>
+          <a:p>
+            <a:r>
+              <a:rPr lang="en-US" dirty="0"/>
+              <a:t>Closed captioning in Teams</a:t>
+            </a:r>
+          </a:p>
+          <a:p>
+            <a:pPr lvl="1"/>
+            <a:r>
+              <a:rPr lang="en-US" dirty="0">
+                <a:hlinkClick r:id="rId4"/>
+              </a:rPr>
+              <a:t>https://microsoftteams.uservoice.com/forums/555103-public/suggestions/18613726-captioning-on-audio-and-or-video-meetings-calls</a:t>
             </a:r>
             <a:endParaRPr lang="en-US" dirty="0"/>
           </a:p>
@@ -6426,6 +6460,36 @@
           </a:p>
         </p:txBody>
       </p:sp>
+      <p:pic>
+        <p:nvPicPr>
+          <p:cNvPr id="4" name="Picture 3">
+            <a:extLst>
+              <a:ext uri="{FF2B5EF4-FFF2-40B4-BE49-F238E27FC236}">
+                <a16:creationId xmlns:a16="http://schemas.microsoft.com/office/drawing/2014/main" id="{E67862C5-D3FC-4C90-887B-21582BCCE253}"/>
+              </a:ext>
+            </a:extLst>
+          </p:cNvPr>
+          <p:cNvPicPr>
+            <a:picLocks noChangeAspect="1"/>
+          </p:cNvPicPr>
+          <p:nvPr/>
+        </p:nvPicPr>
+        <p:blipFill>
+          <a:blip r:embed="rId2"/>
+          <a:stretch>
+            <a:fillRect/>
+          </a:stretch>
+        </p:blipFill>
+        <p:spPr>
+          <a:xfrm>
+            <a:off x="6842222" y="4810991"/>
+            <a:ext cx="4700779" cy="1805420"/>
+          </a:xfrm>
+          <a:prstGeom prst="rect">
+            <a:avLst/>
+          </a:prstGeom>
+        </p:spPr>
+      </p:pic>
     </p:spTree>
     <p:extLst>
       <p:ext uri="{BB962C8B-B14F-4D97-AF65-F5344CB8AC3E}">

</xml_diff>